<commit_message>
kotlin advanced - 5 animations
</commit_message>
<xml_diff>
--- a/slides/Kotlin - 5. Helpful Extensions.pptx
+++ b/slides/Kotlin - 5. Helpful Extensions.pptx
@@ -115,6 +115,11 @@
       </a:defRPr>
     </a:lvl9pPr>
   </p:defaultTextStyle>
+  <p:extLst>
+    <p:ext uri="{EFAFB233-063F-42B5-8137-9DF3F51BA10A}">
+      <p15:sldGuideLst xmlns:p15="http://schemas.microsoft.com/office/powerpoint/2012/main"/>
+    </p:ext>
+  </p:extLst>
 </p:presentation>
 </file>
 
@@ -306,6 +311,11 @@
         </p:txBody>
       </p:sp>
     </p:spTree>
+    <p:extLst>
+      <p:ext uri="{BB962C8B-B14F-4D97-AF65-F5344CB8AC3E}">
+        <p14:creationId xmlns:p14="http://schemas.microsoft.com/office/powerpoint/2010/main" val="273156513"/>
+      </p:ext>
+    </p:extLst>
   </p:cSld>
   <p:clrMap bg1="lt1" tx1="dk1" bg2="lt2" tx2="dk2" accent1="accent1" accent2="accent2" accent3="accent3" accent4="accent4" accent5="accent5" accent6="accent6" hlink="hlink" folHlink="folHlink"/>
   <p:notesStyle>
@@ -563,6 +573,11 @@
         </p:txBody>
       </p:sp>
     </p:spTree>
+    <p:extLst>
+      <p:ext uri="{BB962C8B-B14F-4D97-AF65-F5344CB8AC3E}">
+        <p14:creationId xmlns:p14="http://schemas.microsoft.com/office/powerpoint/2010/main" val="3313944681"/>
+      </p:ext>
+    </p:extLst>
   </p:cSld>
   <p:clrMapOvr>
     <a:masterClrMapping/>
@@ -673,6 +688,11 @@
         </p:txBody>
       </p:sp>
     </p:spTree>
+    <p:extLst>
+      <p:ext uri="{BB962C8B-B14F-4D97-AF65-F5344CB8AC3E}">
+        <p14:creationId xmlns:p14="http://schemas.microsoft.com/office/powerpoint/2010/main" val="1387292302"/>
+      </p:ext>
+    </p:extLst>
   </p:cSld>
   <p:clrMapOvr>
     <a:masterClrMapping/>
@@ -786,6 +806,11 @@
         </p:txBody>
       </p:sp>
     </p:spTree>
+    <p:extLst>
+      <p:ext uri="{BB962C8B-B14F-4D97-AF65-F5344CB8AC3E}">
+        <p14:creationId xmlns:p14="http://schemas.microsoft.com/office/powerpoint/2010/main" val="2864098902"/>
+      </p:ext>
+    </p:extLst>
   </p:cSld>
   <p:clrMapOvr>
     <a:masterClrMapping/>
@@ -899,6 +924,11 @@
         </p:txBody>
       </p:sp>
     </p:spTree>
+    <p:extLst>
+      <p:ext uri="{BB962C8B-B14F-4D97-AF65-F5344CB8AC3E}">
+        <p14:creationId xmlns:p14="http://schemas.microsoft.com/office/powerpoint/2010/main" val="1179075776"/>
+      </p:ext>
+    </p:extLst>
   </p:cSld>
   <p:clrMapOvr>
     <a:masterClrMapping/>
@@ -1012,6 +1042,11 @@
         </p:txBody>
       </p:sp>
     </p:spTree>
+    <p:extLst>
+      <p:ext uri="{BB962C8B-B14F-4D97-AF65-F5344CB8AC3E}">
+        <p14:creationId xmlns:p14="http://schemas.microsoft.com/office/powerpoint/2010/main" val="1729290948"/>
+      </p:ext>
+    </p:extLst>
   </p:cSld>
   <p:clrMapOvr>
     <a:masterClrMapping/>
@@ -1146,6 +1181,11 @@
         </p:txBody>
       </p:sp>
     </p:spTree>
+    <p:extLst>
+      <p:ext uri="{BB962C8B-B14F-4D97-AF65-F5344CB8AC3E}">
+        <p14:creationId xmlns:p14="http://schemas.microsoft.com/office/powerpoint/2010/main" val="2722894980"/>
+      </p:ext>
+    </p:extLst>
   </p:cSld>
   <p:clrMapOvr>
     <a:masterClrMapping/>
@@ -10029,6 +10069,74 @@
           </a:p>
         </p:txBody>
       </p:sp>
+      <p:sp>
+        <p:nvSpPr>
+          <p:cNvPr id="15" name="CustomShape 12"/>
+          <p:cNvSpPr/>
+          <p:nvPr/>
+        </p:nvSpPr>
+        <p:spPr>
+          <a:xfrm>
+            <a:off x="806940" y="6343280"/>
+            <a:ext cx="6593400" cy="315360"/>
+          </a:xfrm>
+          <a:prstGeom prst="rect">
+            <a:avLst/>
+          </a:prstGeom>
+          <a:solidFill>
+            <a:srgbClr val="FFFFFF"/>
+          </a:solidFill>
+          <a:ln>
+            <a:noFill/>
+          </a:ln>
+        </p:spPr>
+        <p:style>
+          <a:lnRef idx="0">
+            <a:scrgbClr r="0" g="0" b="0"/>
+          </a:lnRef>
+          <a:fillRef idx="0">
+            <a:scrgbClr r="0" g="0" b="0"/>
+          </a:fillRef>
+          <a:effectRef idx="0">
+            <a:scrgbClr r="0" g="0" b="0"/>
+          </a:effectRef>
+          <a:fontRef idx="minor"/>
+        </p:style>
+        <p:txBody>
+          <a:bodyPr lIns="90000" tIns="45000" rIns="90000" bIns="45000" anchor="ctr"/>
+          <a:lstStyle/>
+          <a:p>
+            <a:pPr>
+              <a:lnSpc>
+                <a:spcPct val="100000"/>
+              </a:lnSpc>
+            </a:pPr>
+            <a:r>
+              <a:rPr lang="en-US" spc="-1" dirty="0">
+                <a:solidFill>
+                  <a:srgbClr val="000000"/>
+                </a:solidFill>
+                <a:latin typeface="Arial"/>
+                <a:ea typeface="DejaVu Sans"/>
+              </a:rPr>
+              <a:t> </a:t>
+            </a:r>
+            <a:r>
+              <a:rPr lang="en-US" sz="1800" b="0" strike="noStrike" spc="-1" dirty="0" smtClean="0">
+                <a:solidFill>
+                  <a:srgbClr val="000000"/>
+                </a:solidFill>
+                <a:latin typeface="Arial"/>
+                <a:ea typeface="DejaVu Sans"/>
+              </a:rPr>
+              <a:t> </a:t>
+            </a:r>
+            <a:endParaRPr lang="en-US" sz="1800" b="0" strike="noStrike" spc="-1" dirty="0">
+              <a:latin typeface="Arial"/>
+            </a:endParaRPr>
+          </a:p>
+        </p:txBody>
+      </p:sp>
     </p:spTree>
   </p:cSld>
   <p:clrMapOvr>
@@ -10505,7 +10613,7 @@
                             </p:stCondLst>
                             <p:childTnLst>
                               <p:par>
-                                <p:cTn id="45" presetID="1" presetClass="entr" fill="hold" nodeType="clickEffect">
+                                <p:cTn id="45" presetID="1" presetClass="entr" presetSubtype="0" fill="hold" grpId="0" nodeType="clickEffect">
                                   <p:stCondLst>
                                     <p:cond delay="0"/>
                                   </p:stCondLst>
@@ -10519,6 +10627,51 @@
                                         </p:cTn>
                                         <p:tgtEl>
                                           <p:spTgt spid="113"/>
+                                        </p:tgtEl>
+                                        <p:attrNameLst>
+                                          <p:attrName>style.visibility</p:attrName>
+                                        </p:attrNameLst>
+                                      </p:cBhvr>
+                                      <p:to>
+                                        <p:strVal val="visible"/>
+                                      </p:to>
+                                    </p:set>
+                                  </p:childTnLst>
+                                </p:cTn>
+                              </p:par>
+                            </p:childTnLst>
+                          </p:cTn>
+                        </p:par>
+                      </p:childTnLst>
+                    </p:cTn>
+                  </p:par>
+                  <p:par>
+                    <p:cTn id="47" fill="hold">
+                      <p:stCondLst>
+                        <p:cond delay="indefinite"/>
+                      </p:stCondLst>
+                      <p:childTnLst>
+                        <p:par>
+                          <p:cTn id="48" fill="hold">
+                            <p:stCondLst>
+                              <p:cond delay="0"/>
+                            </p:stCondLst>
+                            <p:childTnLst>
+                              <p:par>
+                                <p:cTn id="49" presetID="1" presetClass="entr" presetSubtype="0" fill="hold" grpId="0" nodeType="clickEffect">
+                                  <p:stCondLst>
+                                    <p:cond delay="0"/>
+                                  </p:stCondLst>
+                                  <p:childTnLst>
+                                    <p:set>
+                                      <p:cBhvr>
+                                        <p:cTn id="50" dur="1" fill="hold">
+                                          <p:stCondLst>
+                                            <p:cond delay="0"/>
+                                          </p:stCondLst>
+                                        </p:cTn>
+                                        <p:tgtEl>
+                                          <p:spTgt spid="15"/>
                                         </p:tgtEl>
                                         <p:attrNameLst>
                                           <p:attrName>style.visibility</p:attrName>
@@ -10558,6 +10711,10 @@
         </p:cTn>
       </p:par>
     </p:tnLst>
+    <p:bldLst>
+      <p:bldP spid="113" grpId="0" animBg="1"/>
+      <p:bldP spid="15" grpId="0" animBg="1"/>
+    </p:bldLst>
   </p:timing>
 </p:sld>
 </file>
@@ -12104,6 +12261,9 @@
               </a:rPr>
               <a:t>File(fileName)</a:t>
             </a:r>
+            <a:r>
+              <a:t/>
+            </a:r>
             <a:br/>
             <a:r>
               <a:rPr lang="en-US" sz="1800" b="0" strike="noStrike" spc="-1">
@@ -12135,6 +12295,9 @@
               </a:rPr>
               <a:t>()</a:t>
             </a:r>
+            <a:r>
+              <a:t/>
+            </a:r>
             <a:br/>
             <a:r>
               <a:rPr lang="en-US" sz="1800" b="0" strike="noStrike" spc="-1">
@@ -12176,6 +12339,9 @@
               </a:rPr>
               <a:t>{ </a:t>
             </a:r>
+            <a:r>
+              <a:t/>
+            </a:r>
             <a:br/>
             <a:r>
               <a:rPr lang="en-US" sz="1800" b="1" strike="noStrike" spc="-1">
@@ -12216,6 +12382,9 @@
                 <a:ea typeface="DejaVu Sans"/>
               </a:rPr>
               <a:t>out.println(fileContent) </a:t>
+            </a:r>
+            <a:r>
+              <a:t/>
             </a:r>
             <a:br/>
             <a:r>
@@ -12653,6 +12822,9 @@
               </a:rPr>
               <a:t>{</a:t>
             </a:r>
+            <a:r>
+              <a:t/>
+            </a:r>
             <a:br/>
             <a:r>
               <a:rPr lang="en-US" sz="1800" b="1" strike="noStrike" spc="-1">
@@ -12694,6 +12866,9 @@
               </a:rPr>
               <a:t>)</a:t>
             </a:r>
+            <a:r>
+              <a:t/>
+            </a:r>
             <a:br/>
             <a:r>
               <a:rPr lang="en-US" sz="1800" b="1" strike="noStrike" spc="-1">
@@ -12735,6 +12910,9 @@
               </a:rPr>
               <a:t>{</a:t>
             </a:r>
+            <a:r>
+              <a:t/>
+            </a:r>
             <a:br/>
             <a:r>
               <a:rPr lang="en-US" sz="1800" b="1" strike="noStrike" spc="-1">
@@ -12815,6 +12993,9 @@
                 <a:ea typeface="DejaVu Sans"/>
               </a:rPr>
               <a:t>)</a:t>
+            </a:r>
+            <a:r>
+              <a:t/>
             </a:r>
             <a:br/>
             <a:r>
@@ -13122,6 +13303,10 @@
               </a:rPr>
               <a:t>{</a:t>
             </a:r>
+            <a:r>
+              <a:rPr dirty="0"/>
+              <a:t/>
+            </a:r>
             <a:br>
               <a:rPr dirty="0"/>
             </a:br>
@@ -13245,6 +13430,10 @@
               </a:rPr>
               <a:t> }</a:t>
             </a:r>
+            <a:r>
+              <a:rPr dirty="0"/>
+              <a:t/>
+            </a:r>
             <a:br>
               <a:rPr dirty="0"/>
             </a:br>
@@ -13257,6 +13446,10 @@
                 <a:ea typeface="DejaVu Sans"/>
               </a:rPr>
               <a:t>}</a:t>
+            </a:r>
+            <a:r>
+              <a:rPr dirty="0"/>
+              <a:t/>
             </a:r>
             <a:br>
               <a:rPr dirty="0"/>
@@ -13305,6 +13498,10 @@
                 <a:ea typeface="DejaVu Sans"/>
               </a:rPr>
               <a:t>())</a:t>
+            </a:r>
+            <a:r>
+              <a:rPr dirty="0"/>
+              <a:t/>
             </a:r>
             <a:br>
               <a:rPr dirty="0"/>

</xml_diff>